<commit_message>
Individual based slides update
</commit_message>
<xml_diff>
--- a/slides/Lecture_08_StochasticIBM.pptx
+++ b/slides/Lecture_08_StochasticIBM.pptx
@@ -43,6 +43,7 @@
     <p:sldId id="280" r:id="rId37"/>
     <p:sldId id="281" r:id="rId38"/>
     <p:sldId id="282" r:id="rId39"/>
+    <p:sldId id="309" r:id="rId40"/>
   </p:sldIdLst>
   <p:sldSz cx="9144000" cy="6858000" type="screen4x3"/>
   <p:notesSz cx="6858000" cy="9144000"/>
@@ -321,7 +322,7 @@
             <a:fld id="{05CC55C5-3AE8-4299-988D-DFB8217A9B4E}" type="datetimeFigureOut">
               <a:rPr lang="en-GB" smtClean="0"/>
               <a:pPr/>
-              <a:t>20/04/2023</a:t>
+              <a:t>10/09/2024</a:t>
             </a:fld>
             <a:endParaRPr lang="en-GB" dirty="0"/>
           </a:p>
@@ -677,7 +678,7 @@
           <a:p>
             <a:fld id="{05CC55C5-3AE8-4299-988D-DFB8217A9B4E}" type="datetimeFigureOut">
               <a:rPr lang="en-GB" smtClean="0"/>
-              <a:t>20/04/2023</a:t>
+              <a:t>10/09/2024</a:t>
             </a:fld>
             <a:endParaRPr lang="en-GB"/>
           </a:p>
@@ -2461,7 +2462,7 @@
               <a:rPr lang="en-GB" sz="2100" dirty="0">
                 <a:latin typeface="+mn-lt"/>
               </a:rPr>
-              <a:t>The problem is that some time steps contain multiple events. So let’s take our time step and break it down even further into pieces that are so small, it’s safe to assume that no more than one event can happen in each tiny piece.</a:t>
+              <a:t>The difficulty here is that some time steps contain &gt;1 events. So let’s take our time step and break it down even further into pieces that are so small, it’s safe to assume that no more than one event can happen in each tiny piece.</a:t>
             </a:r>
           </a:p>
         </p:txBody>
@@ -3441,7 +3442,7 @@
               <a:rPr lang="en-GB" sz="2100" dirty="0">
                 <a:latin typeface="+mn-lt"/>
               </a:rPr>
-              <a:t>The problem is that some time steps contain multiple events. So let’s take our time step and break it down even further into pieces that are so small, it’s safe to assume that no more than one event can happen in each tiny piece.</a:t>
+              <a:t>The difficulty here is that some time steps contain &gt;1 events. So let’s take our time step and break it down even further into pieces that are so small, it’s safe to assume that no more than one event can happen in each tiny piece.</a:t>
             </a:r>
           </a:p>
         </p:txBody>
@@ -13355,7 +13356,7 @@
               <a:rPr lang="en-GB" sz="2100" dirty="0">
                 <a:latin typeface="+mn-lt"/>
               </a:rPr>
-              <a:t>PDF with instructions can be found on Moodle.</a:t>
+              <a:t>In the first practical, you will be implementing an SEIR model with waning immunity as a stochastic individual-based model.</a:t>
             </a:r>
           </a:p>
           <a:p>
@@ -13461,32 +13462,6 @@
             <a:endParaRPr sz="1600" dirty="0">
               <a:latin typeface="+mn-lt"/>
             </a:endParaRPr>
-          </a:p>
-          <a:p>
-            <a:pPr marL="0" lvl="0" indent="0">
-              <a:buNone/>
-            </a:pPr>
-            <a:r>
-              <a:rPr dirty="0">
-                <a:latin typeface="Courier" pitchFamily="2" charset="0"/>
-                <a:cs typeface="Courier New" panose="02070309020205020404" pitchFamily="49" charset="0"/>
-              </a:rPr>
-              <a:t>Begin practical: </a:t>
-            </a:r>
-            <a:r>
-              <a:rPr lang="en-GB" dirty="0">
-                <a:latin typeface="Courier" pitchFamily="2" charset="0"/>
-                <a:cs typeface="Courier New" panose="02070309020205020404" pitchFamily="49" charset="0"/>
-              </a:rPr>
-              <a:t>09_StochasticIBM/01_IBM_SEIR</a:t>
-            </a:r>
-            <a:r>
-              <a:rPr dirty="0">
-                <a:latin typeface="Courier" pitchFamily="2" charset="0"/>
-                <a:cs typeface="Courier New" panose="02070309020205020404" pitchFamily="49" charset="0"/>
-              </a:rPr>
-              <a:t>.R</a:t>
-            </a:r>
           </a:p>
         </p:txBody>
       </p:sp>
@@ -18077,32 +18052,6 @@
             <a:pPr lvl="1"/>
             <a:r>
               <a:rPr dirty="0"/>
-              <a:t>We have introduced stochasticity</a:t>
-            </a:r>
-            <a:r>
-              <a:rPr lang="en-GB" dirty="0"/>
-              <a:t> (randomness)</a:t>
-            </a:r>
-            <a:r>
-              <a:rPr dirty="0"/>
-              <a:t> in the network practical</a:t>
-            </a:r>
-            <a:r>
-              <a:rPr lang="en-GB" dirty="0"/>
-              <a:t>.</a:t>
-            </a:r>
-            <a:endParaRPr dirty="0"/>
-          </a:p>
-          <a:p>
-            <a:pPr marL="0" lvl="0" indent="0">
-              <a:buNone/>
-            </a:pPr>
-            <a:endParaRPr dirty="0"/>
-          </a:p>
-          <a:p>
-            <a:pPr lvl="1"/>
-            <a:r>
-              <a:rPr dirty="0"/>
               <a:t>Now we’ll be exploring another kind of model, </a:t>
             </a:r>
             <a:r>
@@ -18235,55 +18184,6 @@
                                           <p:spTgt spid="3">
                                             <p:txEl>
                                               <p:pRg st="4" end="4"/>
-                                            </p:txEl>
-                                          </p:spTgt>
-                                        </p:tgtEl>
-                                        <p:attrNameLst>
-                                          <p:attrName>style.visibility</p:attrName>
-                                        </p:attrNameLst>
-                                      </p:cBhvr>
-                                      <p:to>
-                                        <p:strVal val="visible"/>
-                                      </p:to>
-                                    </p:set>
-                                  </p:childTnLst>
-                                </p:cTn>
-                              </p:par>
-                            </p:childTnLst>
-                          </p:cTn>
-                        </p:par>
-                      </p:childTnLst>
-                    </p:cTn>
-                  </p:par>
-                  <p:par>
-                    <p:cTn id="11" fill="hold">
-                      <p:stCondLst>
-                        <p:cond delay="indefinite"/>
-                      </p:stCondLst>
-                      <p:childTnLst>
-                        <p:par>
-                          <p:cTn id="12" fill="hold">
-                            <p:stCondLst>
-                              <p:cond delay="0"/>
-                            </p:stCondLst>
-                            <p:childTnLst>
-                              <p:par>
-                                <p:cTn id="13" presetID="1" presetClass="entr" presetSubtype="0" fill="hold" nodeType="clickEffect">
-                                  <p:stCondLst>
-                                    <p:cond delay="0"/>
-                                  </p:stCondLst>
-                                  <p:childTnLst>
-                                    <p:set>
-                                      <p:cBhvr>
-                                        <p:cTn id="14" dur="1" fill="hold">
-                                          <p:stCondLst>
-                                            <p:cond delay="0"/>
-                                          </p:stCondLst>
-                                        </p:cTn>
-                                        <p:tgtEl>
-                                          <p:spTgt spid="3">
-                                            <p:txEl>
-                                              <p:pRg st="6" end="6"/>
                                             </p:txEl>
                                           </p:spTgt>
                                         </p:tgtEl>
@@ -19807,7 +19707,7 @@
               <a:rPr lang="en-GB" sz="2100" dirty="0">
                 <a:latin typeface="+mn-lt"/>
               </a:rPr>
-              <a:t>The instructions will guide you through adding: </a:t>
+              <a:t>The instructions online will guide you through adding: </a:t>
             </a:r>
           </a:p>
           <a:p>
@@ -19922,32 +19822,6 @@
             <a:endParaRPr sz="1600" dirty="0">
               <a:latin typeface="+mn-lt"/>
             </a:endParaRPr>
-          </a:p>
-          <a:p>
-            <a:pPr marL="0" lvl="0" indent="0">
-              <a:buNone/>
-            </a:pPr>
-            <a:r>
-              <a:rPr dirty="0">
-                <a:latin typeface="Courier" pitchFamily="2" charset="0"/>
-                <a:cs typeface="Courier New" panose="02070309020205020404" pitchFamily="49" charset="0"/>
-              </a:rPr>
-              <a:t>Begin practical: </a:t>
-            </a:r>
-            <a:r>
-              <a:rPr lang="en-GB" dirty="0">
-                <a:latin typeface="Courier" pitchFamily="2" charset="0"/>
-                <a:cs typeface="Courier New" panose="02070309020205020404" pitchFamily="49" charset="0"/>
-              </a:rPr>
-              <a:t>09_StochasticIBM/02_RevIBM</a:t>
-            </a:r>
-            <a:r>
-              <a:rPr dirty="0">
-                <a:latin typeface="Courier" pitchFamily="2" charset="0"/>
-                <a:cs typeface="Courier New" panose="02070309020205020404" pitchFamily="49" charset="0"/>
-              </a:rPr>
-              <a:t>.R</a:t>
-            </a:r>
           </a:p>
         </p:txBody>
       </p:sp>
@@ -21206,18 +21080,6 @@
               <a:latin typeface="+mj-lt"/>
             </a:endParaRPr>
           </a:p>
-          <a:p>
-            <a:pPr marL="0" lvl="0" indent="0">
-              <a:buNone/>
-            </a:pPr>
-            <a:r>
-              <a:rPr lang="en-GB" dirty="0">
-                <a:latin typeface="Courier" pitchFamily="2" charset="0"/>
-                <a:cs typeface="Courier New" panose="02070309020205020404" pitchFamily="49" charset="0"/>
-              </a:rPr>
-              <a:t>Practical: 09_StochasticIBM/03_Rev2IBM.R</a:t>
-            </a:r>
-          </a:p>
         </p:txBody>
       </p:sp>
     </p:spTree>
@@ -21225,6 +21087,435 @@
   <p:clrMapOvr>
     <a:masterClrMapping/>
   </p:clrMapOvr>
+</p:sld>
+</file>
+
+<file path=ppt/slides/slide39.xml><?xml version="1.0" encoding="utf-8"?>
+<p:sld xmlns:a="http://schemas.openxmlformats.org/drawingml/2006/main" xmlns:r="http://schemas.openxmlformats.org/officeDocument/2006/relationships" xmlns:p="http://schemas.openxmlformats.org/presentationml/2006/main">
+  <p:cSld>
+    <p:spTree>
+      <p:nvGrpSpPr>
+        <p:cNvPr id="1" name="">
+          <a:extLst>
+            <a:ext uri="{FF2B5EF4-FFF2-40B4-BE49-F238E27FC236}">
+              <a16:creationId xmlns:a16="http://schemas.microsoft.com/office/drawing/2014/main" id="{6A6A2EAA-A2E3-E508-9FDF-39C90893934D}"/>
+            </a:ext>
+          </a:extLst>
+        </p:cNvPr>
+        <p:cNvGrpSpPr/>
+        <p:nvPr/>
+      </p:nvGrpSpPr>
+      <p:grpSpPr>
+        <a:xfrm>
+          <a:off x="0" y="0"/>
+          <a:ext cx="0" cy="0"/>
+          <a:chOff x="0" y="0"/>
+          <a:chExt cx="0" cy="0"/>
+        </a:xfrm>
+      </p:grpSpPr>
+      <p:sp>
+        <p:nvSpPr>
+          <p:cNvPr id="5" name="Title 1">
+            <a:extLst>
+              <a:ext uri="{FF2B5EF4-FFF2-40B4-BE49-F238E27FC236}">
+                <a16:creationId xmlns:a16="http://schemas.microsoft.com/office/drawing/2014/main" id="{C3AFF521-763C-08CF-0160-B3D7982D95DB}"/>
+              </a:ext>
+            </a:extLst>
+          </p:cNvPr>
+          <p:cNvSpPr>
+            <a:spLocks noGrp="1"/>
+          </p:cNvSpPr>
+          <p:nvPr>
+            <p:ph type="title" hasCustomPrompt="1"/>
+          </p:nvPr>
+        </p:nvSpPr>
+        <p:spPr>
+          <a:xfrm>
+            <a:off x="457201" y="279132"/>
+            <a:ext cx="6705600" cy="623236"/>
+          </a:xfrm>
+          <a:prstGeom prst="rect">
+            <a:avLst/>
+          </a:prstGeom>
+        </p:spPr>
+        <p:txBody>
+          <a:bodyPr/>
+          <a:lstStyle/>
+          <a:p>
+            <a:pPr marL="0" lvl="0" indent="0">
+              <a:buNone/>
+            </a:pPr>
+            <a:r>
+              <a:rPr lang="en-GB" dirty="0"/>
+              <a:t>Summary</a:t>
+            </a:r>
+            <a:endParaRPr dirty="0"/>
+          </a:p>
+        </p:txBody>
+      </p:sp>
+      <p:sp>
+        <p:nvSpPr>
+          <p:cNvPr id="3" name="Content Placeholder 2">
+            <a:extLst>
+              <a:ext uri="{FF2B5EF4-FFF2-40B4-BE49-F238E27FC236}">
+                <a16:creationId xmlns:a16="http://schemas.microsoft.com/office/drawing/2014/main" id="{DF5A4688-0742-9399-3EBE-0F0F62CAE0C6}"/>
+              </a:ext>
+            </a:extLst>
+          </p:cNvPr>
+          <p:cNvSpPr>
+            <a:spLocks noGrp="1"/>
+          </p:cNvSpPr>
+          <p:nvPr>
+            <p:ph idx="1" hasCustomPrompt="1"/>
+          </p:nvPr>
+        </p:nvSpPr>
+        <p:spPr/>
+        <p:txBody>
+          <a:bodyPr/>
+          <a:lstStyle/>
+          <a:p>
+            <a:pPr lvl="1"/>
+            <a:r>
+              <a:rPr lang="en-GB" b="1" dirty="0"/>
+              <a:t>S</a:t>
+            </a:r>
+            <a:r>
+              <a:rPr b="1" dirty="0" err="1"/>
+              <a:t>tochastic</a:t>
+            </a:r>
+            <a:r>
+              <a:rPr b="1" dirty="0"/>
+              <a:t> individual-based models</a:t>
+            </a:r>
+            <a:r>
+              <a:rPr lang="en-GB" dirty="0"/>
+              <a:t> track individual members of a population and assume that events happen probabilistically, which means that they incorporate random chance.</a:t>
+            </a:r>
+          </a:p>
+          <a:p>
+            <a:pPr lvl="1"/>
+            <a:endParaRPr lang="en-GB" dirty="0"/>
+          </a:p>
+          <a:p>
+            <a:pPr lvl="1"/>
+            <a:r>
+              <a:rPr lang="en-GB" dirty="0"/>
+              <a:t>Individual-based models allow you to do things that compartmental models don’t. </a:t>
+            </a:r>
+          </a:p>
+          <a:p>
+            <a:pPr lvl="2"/>
+            <a:r>
+              <a:rPr lang="en-GB" dirty="0"/>
+              <a:t>But they are more complex to implement and slower to run, so only use them if you need that added complexity.</a:t>
+            </a:r>
+          </a:p>
+          <a:p>
+            <a:pPr lvl="2"/>
+            <a:r>
+              <a:rPr lang="en-GB" dirty="0"/>
+              <a:t>Stochasticity also means we will need to run the model multiple times to get a good summary of what the model is doing.</a:t>
+            </a:r>
+          </a:p>
+          <a:p>
+            <a:pPr lvl="1"/>
+            <a:endParaRPr lang="en-GB" dirty="0"/>
+          </a:p>
+          <a:p>
+            <a:pPr lvl="1"/>
+            <a:r>
+              <a:rPr lang="en-GB" dirty="0"/>
+              <a:t>The run time of an individual-based model in R can be improved by “vectorizing” the code (but an individual-based model will usually still be slower than a deterministic, ODE model equivalent, if one exists).</a:t>
+            </a:r>
+            <a:endParaRPr dirty="0"/>
+          </a:p>
+        </p:txBody>
+      </p:sp>
+    </p:spTree>
+    <p:extLst>
+      <p:ext uri="{BB962C8B-B14F-4D97-AF65-F5344CB8AC3E}">
+        <p14:creationId xmlns:p14="http://schemas.microsoft.com/office/powerpoint/2010/main" val="2037711577"/>
+      </p:ext>
+    </p:extLst>
+  </p:cSld>
+  <p:clrMapOvr>
+    <a:masterClrMapping/>
+  </p:clrMapOvr>
+  <p:timing>
+    <p:tnLst>
+      <p:par>
+        <p:cTn id="1" dur="indefinite" restart="never" nodeType="tmRoot">
+          <p:childTnLst>
+            <p:seq concurrent="1" nextAc="seek">
+              <p:cTn id="2" dur="indefinite" nodeType="mainSeq">
+                <p:childTnLst>
+                  <p:par>
+                    <p:cTn id="3" fill="hold">
+                      <p:stCondLst>
+                        <p:cond delay="indefinite"/>
+                      </p:stCondLst>
+                      <p:childTnLst>
+                        <p:par>
+                          <p:cTn id="4" fill="hold">
+                            <p:stCondLst>
+                              <p:cond delay="0"/>
+                            </p:stCondLst>
+                            <p:childTnLst>
+                              <p:par>
+                                <p:cTn id="5" presetID="1" presetClass="entr" presetSubtype="0" fill="hold" nodeType="clickEffect">
+                                  <p:stCondLst>
+                                    <p:cond delay="0"/>
+                                  </p:stCondLst>
+                                  <p:childTnLst>
+                                    <p:set>
+                                      <p:cBhvr>
+                                        <p:cTn id="6" dur="1" fill="hold">
+                                          <p:stCondLst>
+                                            <p:cond delay="0"/>
+                                          </p:stCondLst>
+                                        </p:cTn>
+                                        <p:tgtEl>
+                                          <p:spTgt spid="3">
+                                            <p:txEl>
+                                              <p:pRg st="0" end="0"/>
+                                            </p:txEl>
+                                          </p:spTgt>
+                                        </p:tgtEl>
+                                        <p:attrNameLst>
+                                          <p:attrName>style.visibility</p:attrName>
+                                        </p:attrNameLst>
+                                      </p:cBhvr>
+                                      <p:to>
+                                        <p:strVal val="visible"/>
+                                      </p:to>
+                                    </p:set>
+                                  </p:childTnLst>
+                                </p:cTn>
+                              </p:par>
+                            </p:childTnLst>
+                          </p:cTn>
+                        </p:par>
+                      </p:childTnLst>
+                    </p:cTn>
+                  </p:par>
+                  <p:par>
+                    <p:cTn id="7" fill="hold">
+                      <p:stCondLst>
+                        <p:cond delay="indefinite"/>
+                      </p:stCondLst>
+                      <p:childTnLst>
+                        <p:par>
+                          <p:cTn id="8" fill="hold">
+                            <p:stCondLst>
+                              <p:cond delay="0"/>
+                            </p:stCondLst>
+                            <p:childTnLst>
+                              <p:par>
+                                <p:cTn id="9" presetID="1" presetClass="entr" presetSubtype="0" fill="hold" nodeType="clickEffect">
+                                  <p:stCondLst>
+                                    <p:cond delay="0"/>
+                                  </p:stCondLst>
+                                  <p:childTnLst>
+                                    <p:set>
+                                      <p:cBhvr>
+                                        <p:cTn id="10" dur="1" fill="hold">
+                                          <p:stCondLst>
+                                            <p:cond delay="0"/>
+                                          </p:stCondLst>
+                                        </p:cTn>
+                                        <p:tgtEl>
+                                          <p:spTgt spid="3">
+                                            <p:txEl>
+                                              <p:pRg st="2" end="2"/>
+                                            </p:txEl>
+                                          </p:spTgt>
+                                        </p:tgtEl>
+                                        <p:attrNameLst>
+                                          <p:attrName>style.visibility</p:attrName>
+                                        </p:attrNameLst>
+                                      </p:cBhvr>
+                                      <p:to>
+                                        <p:strVal val="visible"/>
+                                      </p:to>
+                                    </p:set>
+                                  </p:childTnLst>
+                                </p:cTn>
+                              </p:par>
+                            </p:childTnLst>
+                          </p:cTn>
+                        </p:par>
+                      </p:childTnLst>
+                    </p:cTn>
+                  </p:par>
+                  <p:par>
+                    <p:cTn id="11" fill="hold">
+                      <p:stCondLst>
+                        <p:cond delay="indefinite"/>
+                      </p:stCondLst>
+                      <p:childTnLst>
+                        <p:par>
+                          <p:cTn id="12" fill="hold">
+                            <p:stCondLst>
+                              <p:cond delay="0"/>
+                            </p:stCondLst>
+                            <p:childTnLst>
+                              <p:par>
+                                <p:cTn id="13" presetID="1" presetClass="entr" presetSubtype="0" fill="hold" nodeType="clickEffect">
+                                  <p:stCondLst>
+                                    <p:cond delay="0"/>
+                                  </p:stCondLst>
+                                  <p:childTnLst>
+                                    <p:set>
+                                      <p:cBhvr>
+                                        <p:cTn id="14" dur="1" fill="hold">
+                                          <p:stCondLst>
+                                            <p:cond delay="0"/>
+                                          </p:stCondLst>
+                                        </p:cTn>
+                                        <p:tgtEl>
+                                          <p:spTgt spid="3">
+                                            <p:txEl>
+                                              <p:pRg st="3" end="3"/>
+                                            </p:txEl>
+                                          </p:spTgt>
+                                        </p:tgtEl>
+                                        <p:attrNameLst>
+                                          <p:attrName>style.visibility</p:attrName>
+                                        </p:attrNameLst>
+                                      </p:cBhvr>
+                                      <p:to>
+                                        <p:strVal val="visible"/>
+                                      </p:to>
+                                    </p:set>
+                                  </p:childTnLst>
+                                </p:cTn>
+                              </p:par>
+                            </p:childTnLst>
+                          </p:cTn>
+                        </p:par>
+                      </p:childTnLst>
+                    </p:cTn>
+                  </p:par>
+                  <p:par>
+                    <p:cTn id="15" fill="hold">
+                      <p:stCondLst>
+                        <p:cond delay="indefinite"/>
+                      </p:stCondLst>
+                      <p:childTnLst>
+                        <p:par>
+                          <p:cTn id="16" fill="hold">
+                            <p:stCondLst>
+                              <p:cond delay="0"/>
+                            </p:stCondLst>
+                            <p:childTnLst>
+                              <p:par>
+                                <p:cTn id="17" presetID="1" presetClass="entr" presetSubtype="0" fill="hold" nodeType="clickEffect">
+                                  <p:stCondLst>
+                                    <p:cond delay="0"/>
+                                  </p:stCondLst>
+                                  <p:childTnLst>
+                                    <p:set>
+                                      <p:cBhvr>
+                                        <p:cTn id="18" dur="1" fill="hold">
+                                          <p:stCondLst>
+                                            <p:cond delay="0"/>
+                                          </p:stCondLst>
+                                        </p:cTn>
+                                        <p:tgtEl>
+                                          <p:spTgt spid="3">
+                                            <p:txEl>
+                                              <p:pRg st="4" end="4"/>
+                                            </p:txEl>
+                                          </p:spTgt>
+                                        </p:tgtEl>
+                                        <p:attrNameLst>
+                                          <p:attrName>style.visibility</p:attrName>
+                                        </p:attrNameLst>
+                                      </p:cBhvr>
+                                      <p:to>
+                                        <p:strVal val="visible"/>
+                                      </p:to>
+                                    </p:set>
+                                  </p:childTnLst>
+                                </p:cTn>
+                              </p:par>
+                            </p:childTnLst>
+                          </p:cTn>
+                        </p:par>
+                      </p:childTnLst>
+                    </p:cTn>
+                  </p:par>
+                  <p:par>
+                    <p:cTn id="19" fill="hold">
+                      <p:stCondLst>
+                        <p:cond delay="indefinite"/>
+                      </p:stCondLst>
+                      <p:childTnLst>
+                        <p:par>
+                          <p:cTn id="20" fill="hold">
+                            <p:stCondLst>
+                              <p:cond delay="0"/>
+                            </p:stCondLst>
+                            <p:childTnLst>
+                              <p:par>
+                                <p:cTn id="21" presetID="1" presetClass="entr" presetSubtype="0" fill="hold" nodeType="clickEffect">
+                                  <p:stCondLst>
+                                    <p:cond delay="0"/>
+                                  </p:stCondLst>
+                                  <p:childTnLst>
+                                    <p:set>
+                                      <p:cBhvr>
+                                        <p:cTn id="22" dur="1" fill="hold">
+                                          <p:stCondLst>
+                                            <p:cond delay="0"/>
+                                          </p:stCondLst>
+                                        </p:cTn>
+                                        <p:tgtEl>
+                                          <p:spTgt spid="3">
+                                            <p:txEl>
+                                              <p:pRg st="6" end="6"/>
+                                            </p:txEl>
+                                          </p:spTgt>
+                                        </p:tgtEl>
+                                        <p:attrNameLst>
+                                          <p:attrName>style.visibility</p:attrName>
+                                        </p:attrNameLst>
+                                      </p:cBhvr>
+                                      <p:to>
+                                        <p:strVal val="visible"/>
+                                      </p:to>
+                                    </p:set>
+                                  </p:childTnLst>
+                                </p:cTn>
+                              </p:par>
+                            </p:childTnLst>
+                          </p:cTn>
+                        </p:par>
+                      </p:childTnLst>
+                    </p:cTn>
+                  </p:par>
+                </p:childTnLst>
+              </p:cTn>
+              <p:prevCondLst>
+                <p:cond evt="onPrev" delay="0">
+                  <p:tgtEl>
+                    <p:sldTgt/>
+                  </p:tgtEl>
+                </p:cond>
+              </p:prevCondLst>
+              <p:nextCondLst>
+                <p:cond evt="onNext" delay="0">
+                  <p:tgtEl>
+                    <p:sldTgt/>
+                  </p:tgtEl>
+                </p:cond>
+              </p:nextCondLst>
+            </p:seq>
+          </p:childTnLst>
+        </p:cTn>
+      </p:par>
+    </p:tnLst>
+  </p:timing>
 </p:sld>
 </file>
 
@@ -24377,6 +24668,33 @@
                                   </p:childTnLst>
                                 </p:cTn>
                               </p:par>
+                              <p:par>
+                                <p:cTn id="11" presetID="1" presetClass="entr" presetSubtype="0" fill="hold" grpId="0" nodeType="withEffect">
+                                  <p:stCondLst>
+                                    <p:cond delay="0"/>
+                                  </p:stCondLst>
+                                  <p:childTnLst>
+                                    <p:set>
+                                      <p:cBhvr>
+                                        <p:cTn id="12" dur="1" fill="hold">
+                                          <p:stCondLst>
+                                            <p:cond delay="0"/>
+                                          </p:stCondLst>
+                                        </p:cTn>
+                                        <p:tgtEl>
+                                          <p:spTgt spid="2"/>
+                                        </p:tgtEl>
+                                        <p:attrNameLst>
+                                          <p:attrName>style.visibility</p:attrName>
+                                        </p:attrNameLst>
+                                      </p:cBhvr>
+                                      <p:to>
+                                        <p:strVal val="visible"/>
+                                      </p:to>
+                                    </p:set>
+                                  </p:childTnLst>
+                                </p:cTn>
+                              </p:par>
                             </p:childTnLst>
                           </p:cTn>
                         </p:par>
@@ -24404,6 +24722,9 @@
         </p:cTn>
       </p:par>
     </p:tnLst>
+    <p:bldLst>
+      <p:bldP spid="2" grpId="0"/>
+    </p:bldLst>
   </p:timing>
 </p:sld>
 </file>

</xml_diff>